<commit_message>
state space small fix
</commit_message>
<xml_diff>
--- a/Exercises/state_space/state_space_exercise.pptx
+++ b/Exercises/state_space/state_space_exercise.pptx
@@ -208,7 +208,7 @@
           <a:p>
             <a:fld id="{99D4630A-6D3B-4C97-A7DC-509EB0048625}" type="datetimeFigureOut">
               <a:rPr lang="it-CH" smtClean="0"/>
-              <a:t>09.04.24</a:t>
+              <a:t>16.04.24</a:t>
             </a:fld>
             <a:endParaRPr lang="it-CH"/>
           </a:p>
@@ -1647,7 +1647,7 @@
           <a:p>
             <a:fld id="{2A147C38-CC24-4E9D-9FE1-BE5105214113}" type="datetimeFigureOut">
               <a:rPr lang="it-CH" smtClean="0"/>
-              <a:t>09.04.24</a:t>
+              <a:t>16.04.24</a:t>
             </a:fld>
             <a:endParaRPr lang="it-CH"/>
           </a:p>
@@ -1855,7 +1855,7 @@
           <a:p>
             <a:fld id="{2A147C38-CC24-4E9D-9FE1-BE5105214113}" type="datetimeFigureOut">
               <a:rPr lang="it-CH" smtClean="0"/>
-              <a:t>09.04.24</a:t>
+              <a:t>16.04.24</a:t>
             </a:fld>
             <a:endParaRPr lang="it-CH"/>
           </a:p>
@@ -2068,7 +2068,7 @@
           <a:p>
             <a:fld id="{2A147C38-CC24-4E9D-9FE1-BE5105214113}" type="datetimeFigureOut">
               <a:rPr lang="it-CH" smtClean="0"/>
-              <a:t>09.04.24</a:t>
+              <a:t>16.04.24</a:t>
             </a:fld>
             <a:endParaRPr lang="it-CH"/>
           </a:p>
@@ -2399,7 +2399,7 @@
           <a:p>
             <a:fld id="{2A147C38-CC24-4E9D-9FE1-BE5105214113}" type="datetimeFigureOut">
               <a:rPr lang="it-CH" smtClean="0"/>
-              <a:t>09.04.24</a:t>
+              <a:t>16.04.24</a:t>
             </a:fld>
             <a:endParaRPr lang="it-CH"/>
           </a:p>
@@ -2678,7 +2678,7 @@
           <a:p>
             <a:fld id="{2A147C38-CC24-4E9D-9FE1-BE5105214113}" type="datetimeFigureOut">
               <a:rPr lang="it-CH" smtClean="0"/>
-              <a:t>09.04.24</a:t>
+              <a:t>16.04.24</a:t>
             </a:fld>
             <a:endParaRPr lang="it-CH"/>
           </a:p>
@@ -2954,7 +2954,7 @@
           <a:p>
             <a:fld id="{2A147C38-CC24-4E9D-9FE1-BE5105214113}" type="datetimeFigureOut">
               <a:rPr lang="it-CH" smtClean="0"/>
-              <a:t>09.04.24</a:t>
+              <a:t>16.04.24</a:t>
             </a:fld>
             <a:endParaRPr lang="it-CH"/>
           </a:p>
@@ -3372,7 +3372,7 @@
           <a:p>
             <a:fld id="{2A147C38-CC24-4E9D-9FE1-BE5105214113}" type="datetimeFigureOut">
               <a:rPr lang="it-CH" smtClean="0"/>
-              <a:t>09.04.24</a:t>
+              <a:t>16.04.24</a:t>
             </a:fld>
             <a:endParaRPr lang="it-CH"/>
           </a:p>
@@ -3522,7 +3522,7 @@
           <a:p>
             <a:fld id="{2A147C38-CC24-4E9D-9FE1-BE5105214113}" type="datetimeFigureOut">
               <a:rPr lang="it-CH" smtClean="0"/>
-              <a:t>09.04.24</a:t>
+              <a:t>16.04.24</a:t>
             </a:fld>
             <a:endParaRPr lang="it-CH"/>
           </a:p>
@@ -3635,7 +3635,7 @@
           <a:p>
             <a:fld id="{2A147C38-CC24-4E9D-9FE1-BE5105214113}" type="datetimeFigureOut">
               <a:rPr lang="it-CH" smtClean="0"/>
-              <a:t>09.04.24</a:t>
+              <a:t>16.04.24</a:t>
             </a:fld>
             <a:endParaRPr lang="it-CH"/>
           </a:p>
@@ -3951,7 +3951,7 @@
           <a:p>
             <a:fld id="{2A147C38-CC24-4E9D-9FE1-BE5105214113}" type="datetimeFigureOut">
               <a:rPr lang="it-CH" smtClean="0"/>
-              <a:t>09.04.24</a:t>
+              <a:t>16.04.24</a:t>
             </a:fld>
             <a:endParaRPr lang="it-CH"/>
           </a:p>
@@ -4243,7 +4243,7 @@
           <a:p>
             <a:fld id="{2A147C38-CC24-4E9D-9FE1-BE5105214113}" type="datetimeFigureOut">
               <a:rPr lang="it-CH" smtClean="0"/>
-              <a:t>09.04.24</a:t>
+              <a:t>16.04.24</a:t>
             </a:fld>
             <a:endParaRPr lang="it-CH"/>
           </a:p>
@@ -4486,7 +4486,7 @@
           <a:p>
             <a:fld id="{2A147C38-CC24-4E9D-9FE1-BE5105214113}" type="datetimeFigureOut">
               <a:rPr lang="it-CH" smtClean="0"/>
-              <a:t>09.04.24</a:t>
+              <a:t>16.04.24</a:t>
             </a:fld>
             <a:endParaRPr lang="it-CH"/>
           </a:p>
@@ -4942,7 +4942,7 @@
         <p:spPr>
           <a:xfrm>
             <a:off x="355801" y="3190028"/>
-            <a:ext cx="11712374" cy="3037563"/>
+            <a:ext cx="11712374" cy="2991396"/>
           </a:xfrm>
           <a:prstGeom prst="rect">
             <a:avLst/>
@@ -4968,7 +4968,7 @@
                   </a:schemeClr>
                 </a:solidFill>
               </a:rPr>
-              <a:t>Neural state-space models</a:t>
+              <a:t>Deep learning for state-space identification</a:t>
             </a:r>
           </a:p>
           <a:p>
@@ -4978,15 +4978,22 @@
               </a:lnSpc>
             </a:pPr>
             <a:r>
-              <a:rPr lang="en-US" sz="2400" dirty="0">
+              <a:rPr lang="en-US" sz="2400">
                 <a:solidFill>
                   <a:schemeClr val="accent1">
                     <a:lumMod val="75000"/>
                   </a:schemeClr>
                 </a:solidFill>
               </a:rPr>
-              <a:t>Introduction</a:t>
+              <a:t>Exercises</a:t>
             </a:r>
+            <a:endParaRPr lang="en-US" sz="2400" dirty="0">
+              <a:solidFill>
+                <a:schemeClr val="accent1">
+                  <a:lumMod val="75000"/>
+                </a:schemeClr>
+              </a:solidFill>
+            </a:endParaRPr>
           </a:p>
           <a:p>
             <a:pPr>
@@ -5220,11 +5227,15 @@
           <a:p>
             <a:r>
               <a:rPr lang="en-US" dirty="0"/>
-              <a:t>Lugano, April, 22</a:t>
+              <a:t>Lugano, April</a:t>
             </a:r>
             <a:r>
-              <a:rPr lang="en-US" baseline="30000" dirty="0"/>
-              <a:t>nd</a:t>
+              <a:rPr lang="en-US"/>
+              <a:t>, 23</a:t>
+            </a:r>
+            <a:r>
+              <a:rPr lang="en-US" baseline="30000"/>
+              <a:t>rd</a:t>
             </a:r>
             <a:r>
               <a:rPr lang="en-US" dirty="0"/>
@@ -9015,8 +9026,8 @@
           </a:fontRef>
         </p:style>
       </p:cxnSp>
-      <mc:AlternateContent xmlns:mc="http://schemas.openxmlformats.org/markup-compatibility/2006">
-        <mc:Choice xmlns:a14="http://schemas.microsoft.com/office/drawing/2010/main" Requires="a14">
+      <mc:AlternateContent xmlns:mc="http://schemas.openxmlformats.org/markup-compatibility/2006" xmlns:a14="http://schemas.microsoft.com/office/drawing/2010/main">
+        <mc:Choice Requires="a14">
           <p:sp>
             <p:nvSpPr>
               <p:cNvPr id="2" name="CasellaDiTesto 1">
@@ -9279,7 +9290,7 @@
             </p:txBody>
           </p:sp>
         </mc:Choice>
-        <mc:Fallback>
+        <mc:Fallback xmlns="">
           <p:sp>
             <p:nvSpPr>
               <p:cNvPr id="2" name="CasellaDiTesto 1">

</xml_diff>

<commit_message>
minor state space modification
</commit_message>
<xml_diff>
--- a/Exercises/state_space/state_space_exercise.pptx
+++ b/Exercises/state_space/state_space_exercise.pptx
@@ -208,7 +208,7 @@
           <a:p>
             <a:fld id="{99D4630A-6D3B-4C97-A7DC-509EB0048625}" type="datetimeFigureOut">
               <a:rPr lang="it-CH" smtClean="0"/>
-              <a:t>20.04.24</a:t>
+              <a:t>21.04.24</a:t>
             </a:fld>
             <a:endParaRPr lang="it-CH"/>
           </a:p>
@@ -1647,7 +1647,7 @@
           <a:p>
             <a:fld id="{2A147C38-CC24-4E9D-9FE1-BE5105214113}" type="datetimeFigureOut">
               <a:rPr lang="it-CH" smtClean="0"/>
-              <a:t>20.04.24</a:t>
+              <a:t>21.04.24</a:t>
             </a:fld>
             <a:endParaRPr lang="it-CH"/>
           </a:p>
@@ -1855,7 +1855,7 @@
           <a:p>
             <a:fld id="{2A147C38-CC24-4E9D-9FE1-BE5105214113}" type="datetimeFigureOut">
               <a:rPr lang="it-CH" smtClean="0"/>
-              <a:t>20.04.24</a:t>
+              <a:t>21.04.24</a:t>
             </a:fld>
             <a:endParaRPr lang="it-CH"/>
           </a:p>
@@ -2068,7 +2068,7 @@
           <a:p>
             <a:fld id="{2A147C38-CC24-4E9D-9FE1-BE5105214113}" type="datetimeFigureOut">
               <a:rPr lang="it-CH" smtClean="0"/>
-              <a:t>20.04.24</a:t>
+              <a:t>21.04.24</a:t>
             </a:fld>
             <a:endParaRPr lang="it-CH"/>
           </a:p>
@@ -2399,7 +2399,7 @@
           <a:p>
             <a:fld id="{2A147C38-CC24-4E9D-9FE1-BE5105214113}" type="datetimeFigureOut">
               <a:rPr lang="it-CH" smtClean="0"/>
-              <a:t>20.04.24</a:t>
+              <a:t>21.04.24</a:t>
             </a:fld>
             <a:endParaRPr lang="it-CH"/>
           </a:p>
@@ -2678,7 +2678,7 @@
           <a:p>
             <a:fld id="{2A147C38-CC24-4E9D-9FE1-BE5105214113}" type="datetimeFigureOut">
               <a:rPr lang="it-CH" smtClean="0"/>
-              <a:t>20.04.24</a:t>
+              <a:t>21.04.24</a:t>
             </a:fld>
             <a:endParaRPr lang="it-CH"/>
           </a:p>
@@ -2954,7 +2954,7 @@
           <a:p>
             <a:fld id="{2A147C38-CC24-4E9D-9FE1-BE5105214113}" type="datetimeFigureOut">
               <a:rPr lang="it-CH" smtClean="0"/>
-              <a:t>20.04.24</a:t>
+              <a:t>21.04.24</a:t>
             </a:fld>
             <a:endParaRPr lang="it-CH"/>
           </a:p>
@@ -3372,7 +3372,7 @@
           <a:p>
             <a:fld id="{2A147C38-CC24-4E9D-9FE1-BE5105214113}" type="datetimeFigureOut">
               <a:rPr lang="it-CH" smtClean="0"/>
-              <a:t>20.04.24</a:t>
+              <a:t>21.04.24</a:t>
             </a:fld>
             <a:endParaRPr lang="it-CH"/>
           </a:p>
@@ -3522,7 +3522,7 @@
           <a:p>
             <a:fld id="{2A147C38-CC24-4E9D-9FE1-BE5105214113}" type="datetimeFigureOut">
               <a:rPr lang="it-CH" smtClean="0"/>
-              <a:t>20.04.24</a:t>
+              <a:t>21.04.24</a:t>
             </a:fld>
             <a:endParaRPr lang="it-CH"/>
           </a:p>
@@ -3635,7 +3635,7 @@
           <a:p>
             <a:fld id="{2A147C38-CC24-4E9D-9FE1-BE5105214113}" type="datetimeFigureOut">
               <a:rPr lang="it-CH" smtClean="0"/>
-              <a:t>20.04.24</a:t>
+              <a:t>21.04.24</a:t>
             </a:fld>
             <a:endParaRPr lang="it-CH"/>
           </a:p>
@@ -3951,7 +3951,7 @@
           <a:p>
             <a:fld id="{2A147C38-CC24-4E9D-9FE1-BE5105214113}" type="datetimeFigureOut">
               <a:rPr lang="it-CH" smtClean="0"/>
-              <a:t>20.04.24</a:t>
+              <a:t>21.04.24</a:t>
             </a:fld>
             <a:endParaRPr lang="it-CH"/>
           </a:p>
@@ -4243,7 +4243,7 @@
           <a:p>
             <a:fld id="{2A147C38-CC24-4E9D-9FE1-BE5105214113}" type="datetimeFigureOut">
               <a:rPr lang="it-CH" smtClean="0"/>
-              <a:t>20.04.24</a:t>
+              <a:t>21.04.24</a:t>
             </a:fld>
             <a:endParaRPr lang="it-CH"/>
           </a:p>
@@ -4486,7 +4486,7 @@
           <a:p>
             <a:fld id="{2A147C38-CC24-4E9D-9FE1-BE5105214113}" type="datetimeFigureOut">
               <a:rPr lang="it-CH" smtClean="0"/>
-              <a:t>20.04.24</a:t>
+              <a:t>21.04.24</a:t>
             </a:fld>
             <a:endParaRPr lang="it-CH"/>
           </a:p>
@@ -8874,8 +8874,8 @@
           </a:fontRef>
         </p:style>
       </p:cxnSp>
-      <mc:AlternateContent xmlns:mc="http://schemas.openxmlformats.org/markup-compatibility/2006" xmlns:a14="http://schemas.microsoft.com/office/drawing/2010/main">
-        <mc:Choice Requires="a14">
+      <mc:AlternateContent xmlns:mc="http://schemas.openxmlformats.org/markup-compatibility/2006">
+        <mc:Choice xmlns:a14="http://schemas.microsoft.com/office/drawing/2010/main" Requires="a14">
           <p:sp>
             <p:nvSpPr>
               <p:cNvPr id="2" name="CasellaDiTesto 1">
@@ -9131,8 +9131,27 @@
                   <a:buChar char="•"/>
                 </a:pPr>
                 <a:r>
+                  <a:rPr lang="it-CH" sz="2000"/>
+                  <a:t>Training </a:t>
+                </a:r>
+                <a:r>
                   <a:rPr lang="it-CH" sz="2000" dirty="0"/>
-                  <a:t>Train also with respect to </a:t>
+                  <a:t>with respect to both </a:t>
+                </a:r>
+                <a14:m>
+                  <m:oMath xmlns:m="http://schemas.openxmlformats.org/officeDocument/2006/math">
+                    <m:r>
+                      <a:rPr lang="it-CH" sz="2000" i="1" smtClean="0">
+                        <a:latin typeface="Cambria Math" panose="02040503050406030204" pitchFamily="18" charset="0"/>
+                        <a:ea typeface="Cambria Math" panose="02040503050406030204" pitchFamily="18" charset="0"/>
+                      </a:rPr>
+                      <m:t>𝜃</m:t>
+                    </m:r>
+                  </m:oMath>
+                </a14:m>
+                <a:r>
+                  <a:rPr lang="it-CH" sz="2000" dirty="0"/>
+                  <a:t> and </a:t>
                 </a:r>
                 <a14:m>
                   <m:oMath xmlns:m="http://schemas.openxmlformats.org/officeDocument/2006/math">
@@ -9223,7 +9242,7 @@
             </p:txBody>
           </p:sp>
         </mc:Choice>
-        <mc:Fallback xmlns="">
+        <mc:Fallback>
           <p:sp>
             <p:nvSpPr>
               <p:cNvPr id="2" name="CasellaDiTesto 1">
@@ -10129,8 +10148,8 @@
           </a:fontRef>
         </p:style>
       </p:cxnSp>
-      <mc:AlternateContent xmlns:mc="http://schemas.openxmlformats.org/markup-compatibility/2006">
-        <mc:Choice xmlns:a14="http://schemas.microsoft.com/office/drawing/2010/main" Requires="a14">
+      <mc:AlternateContent xmlns:mc="http://schemas.openxmlformats.org/markup-compatibility/2006" xmlns:a14="http://schemas.microsoft.com/office/drawing/2010/main">
+        <mc:Choice Requires="a14">
           <p:sp>
             <p:nvSpPr>
               <p:cNvPr id="2" name="CasellaDiTesto 1">
@@ -10294,7 +10313,7 @@
             </p:txBody>
           </p:sp>
         </mc:Choice>
-        <mc:Fallback>
+        <mc:Fallback xmlns="">
           <p:sp>
             <p:nvSpPr>
               <p:cNvPr id="2" name="CasellaDiTesto 1">

</xml_diff>